<commit_message>
add font file & loco image
</commit_message>
<xml_diff>
--- a/design.pptx
+++ b/design.pptx
@@ -11,6 +11,7 @@
     <p:sldId id="261" r:id="rId5"/>
     <p:sldId id="262" r:id="rId6"/>
     <p:sldId id="263" r:id="rId7"/>
+    <p:sldId id="264" r:id="rId8"/>
   </p:sldIdLst>
   <p:sldSz cx="5761038" cy="5761038"/>
   <p:notesSz cx="6858000" cy="9144000"/>
@@ -308,7 +309,7 @@
             <a:fld id="{B431DB3D-C2BB-4DBE-9C63-7A3084D9948D}" type="datetimeFigureOut">
               <a:rPr lang="ko-KR" altLang="en-US" smtClean="0"/>
               <a:pPr/>
-              <a:t>2021-03-21</a:t>
+              <a:t>2021-03-22</a:t>
             </a:fld>
             <a:endParaRPr lang="ko-KR" altLang="en-US"/>
           </a:p>
@@ -473,7 +474,7 @@
             <a:fld id="{B431DB3D-C2BB-4DBE-9C63-7A3084D9948D}" type="datetimeFigureOut">
               <a:rPr lang="ko-KR" altLang="en-US" smtClean="0"/>
               <a:pPr/>
-              <a:t>2021-03-21</a:t>
+              <a:t>2021-03-22</a:t>
             </a:fld>
             <a:endParaRPr lang="ko-KR" altLang="en-US"/>
           </a:p>
@@ -648,7 +649,7 @@
             <a:fld id="{B431DB3D-C2BB-4DBE-9C63-7A3084D9948D}" type="datetimeFigureOut">
               <a:rPr lang="ko-KR" altLang="en-US" smtClean="0"/>
               <a:pPr/>
-              <a:t>2021-03-21</a:t>
+              <a:t>2021-03-22</a:t>
             </a:fld>
             <a:endParaRPr lang="ko-KR" altLang="en-US"/>
           </a:p>
@@ -813,7 +814,7 @@
             <a:fld id="{B431DB3D-C2BB-4DBE-9C63-7A3084D9948D}" type="datetimeFigureOut">
               <a:rPr lang="ko-KR" altLang="en-US" smtClean="0"/>
               <a:pPr/>
-              <a:t>2021-03-21</a:t>
+              <a:t>2021-03-22</a:t>
             </a:fld>
             <a:endParaRPr lang="ko-KR" altLang="en-US"/>
           </a:p>
@@ -1055,7 +1056,7 @@
             <a:fld id="{B431DB3D-C2BB-4DBE-9C63-7A3084D9948D}" type="datetimeFigureOut">
               <a:rPr lang="ko-KR" altLang="en-US" smtClean="0"/>
               <a:pPr/>
-              <a:t>2021-03-21</a:t>
+              <a:t>2021-03-22</a:t>
             </a:fld>
             <a:endParaRPr lang="ko-KR" altLang="en-US"/>
           </a:p>
@@ -1337,7 +1338,7 @@
             <a:fld id="{B431DB3D-C2BB-4DBE-9C63-7A3084D9948D}" type="datetimeFigureOut">
               <a:rPr lang="ko-KR" altLang="en-US" smtClean="0"/>
               <a:pPr/>
-              <a:t>2021-03-21</a:t>
+              <a:t>2021-03-22</a:t>
             </a:fld>
             <a:endParaRPr lang="ko-KR" altLang="en-US"/>
           </a:p>
@@ -1758,7 +1759,7 @@
             <a:fld id="{B431DB3D-C2BB-4DBE-9C63-7A3084D9948D}" type="datetimeFigureOut">
               <a:rPr lang="ko-KR" altLang="en-US" smtClean="0"/>
               <a:pPr/>
-              <a:t>2021-03-21</a:t>
+              <a:t>2021-03-22</a:t>
             </a:fld>
             <a:endParaRPr lang="ko-KR" altLang="en-US"/>
           </a:p>
@@ -1872,7 +1873,7 @@
             <a:fld id="{B431DB3D-C2BB-4DBE-9C63-7A3084D9948D}" type="datetimeFigureOut">
               <a:rPr lang="ko-KR" altLang="en-US" smtClean="0"/>
               <a:pPr/>
-              <a:t>2021-03-21</a:t>
+              <a:t>2021-03-22</a:t>
             </a:fld>
             <a:endParaRPr lang="ko-KR" altLang="en-US"/>
           </a:p>
@@ -1964,7 +1965,7 @@
             <a:fld id="{B431DB3D-C2BB-4DBE-9C63-7A3084D9948D}" type="datetimeFigureOut">
               <a:rPr lang="ko-KR" altLang="en-US" smtClean="0"/>
               <a:pPr/>
-              <a:t>2021-03-21</a:t>
+              <a:t>2021-03-22</a:t>
             </a:fld>
             <a:endParaRPr lang="ko-KR" altLang="en-US"/>
           </a:p>
@@ -2236,7 +2237,7 @@
             <a:fld id="{B431DB3D-C2BB-4DBE-9C63-7A3084D9948D}" type="datetimeFigureOut">
               <a:rPr lang="ko-KR" altLang="en-US" smtClean="0"/>
               <a:pPr/>
-              <a:t>2021-03-21</a:t>
+              <a:t>2021-03-22</a:t>
             </a:fld>
             <a:endParaRPr lang="ko-KR" altLang="en-US"/>
           </a:p>
@@ -2485,7 +2486,7 @@
             <a:fld id="{B431DB3D-C2BB-4DBE-9C63-7A3084D9948D}" type="datetimeFigureOut">
               <a:rPr lang="ko-KR" altLang="en-US" smtClean="0"/>
               <a:pPr/>
-              <a:t>2021-03-21</a:t>
+              <a:t>2021-03-22</a:t>
             </a:fld>
             <a:endParaRPr lang="ko-KR" altLang="en-US"/>
           </a:p>
@@ -2693,7 +2694,7 @@
             <a:fld id="{B431DB3D-C2BB-4DBE-9C63-7A3084D9948D}" type="datetimeFigureOut">
               <a:rPr lang="ko-KR" altLang="en-US" smtClean="0"/>
               <a:pPr/>
-              <a:t>2021-03-21</a:t>
+              <a:t>2021-03-22</a:t>
             </a:fld>
             <a:endParaRPr lang="ko-KR" altLang="en-US"/>
           </a:p>
@@ -16929,6 +16930,332 @@
 </p:sld>
 </file>
 
+<file path=ppt/slides/slide7.xml><?xml version="1.0" encoding="utf-8"?>
+<p:sld xmlns:a="http://schemas.openxmlformats.org/drawingml/2006/main" xmlns:r="http://schemas.openxmlformats.org/officeDocument/2006/relationships" xmlns:p="http://schemas.openxmlformats.org/presentationml/2006/main">
+  <p:cSld>
+    <p:spTree>
+      <p:nvGrpSpPr>
+        <p:cNvPr id="1" name=""/>
+        <p:cNvGrpSpPr/>
+        <p:nvPr/>
+      </p:nvGrpSpPr>
+      <p:grpSpPr>
+        <a:xfrm>
+          <a:off x="0" y="0"/>
+          <a:ext cx="0" cy="0"/>
+          <a:chOff x="0" y="0"/>
+          <a:chExt cx="0" cy="0"/>
+        </a:xfrm>
+      </p:grpSpPr>
+      <p:sp>
+        <p:nvSpPr>
+          <p:cNvPr id="2" name="사각형: 둥근 모서리 1">
+            <a:extLst>
+              <a:ext uri="{FF2B5EF4-FFF2-40B4-BE49-F238E27FC236}">
+                <a16:creationId xmlns:a16="http://schemas.microsoft.com/office/drawing/2014/main" id="{720BD0EF-147A-4606-925F-F1CB1545E644}"/>
+              </a:ext>
+            </a:extLst>
+          </p:cNvPr>
+          <p:cNvSpPr/>
+          <p:nvPr/>
+        </p:nvSpPr>
+        <p:spPr>
+          <a:xfrm>
+            <a:off x="1184143" y="814240"/>
+            <a:ext cx="2952328" cy="2952328"/>
+          </a:xfrm>
+          <a:prstGeom prst="roundRect">
+            <a:avLst/>
+          </a:prstGeom>
+          <a:solidFill>
+            <a:schemeClr val="accent5">
+              <a:lumMod val="60000"/>
+              <a:lumOff val="40000"/>
+              <a:alpha val="75000"/>
+            </a:schemeClr>
+          </a:solidFill>
+          <a:ln>
+            <a:noFill/>
+          </a:ln>
+          <a:scene3d>
+            <a:camera prst="orthographicFront"/>
+            <a:lightRig rig="threePt" dir="t"/>
+          </a:scene3d>
+          <a:sp3d>
+            <a:bevelT/>
+          </a:sp3d>
+        </p:spPr>
+        <p:style>
+          <a:lnRef idx="2">
+            <a:schemeClr val="accent1">
+              <a:shade val="50000"/>
+            </a:schemeClr>
+          </a:lnRef>
+          <a:fillRef idx="1">
+            <a:schemeClr val="accent1"/>
+          </a:fillRef>
+          <a:effectRef idx="0">
+            <a:schemeClr val="accent1"/>
+          </a:effectRef>
+          <a:fontRef idx="minor">
+            <a:schemeClr val="lt1"/>
+          </a:fontRef>
+        </p:style>
+        <p:txBody>
+          <a:bodyPr rtlCol="0" anchor="ctr"/>
+          <a:lstStyle/>
+          <a:p>
+            <a:pPr algn="ctr"/>
+            <a:endParaRPr lang="ko-KR" altLang="en-US" dirty="0"/>
+          </a:p>
+        </p:txBody>
+      </p:sp>
+      <p:grpSp>
+        <p:nvGrpSpPr>
+          <p:cNvPr id="4" name="그룹 3">
+            <a:extLst>
+              <a:ext uri="{FF2B5EF4-FFF2-40B4-BE49-F238E27FC236}">
+                <a16:creationId xmlns:a16="http://schemas.microsoft.com/office/drawing/2014/main" id="{0CE4E01C-1907-436A-8C27-E6B4383F7773}"/>
+              </a:ext>
+            </a:extLst>
+          </p:cNvPr>
+          <p:cNvGrpSpPr/>
+          <p:nvPr/>
+        </p:nvGrpSpPr>
+        <p:grpSpPr>
+          <a:xfrm>
+            <a:off x="1375487" y="1030264"/>
+            <a:ext cx="2569641" cy="2520280"/>
+            <a:chOff x="2808511" y="3983276"/>
+            <a:chExt cx="1440160" cy="1440160"/>
+          </a:xfrm>
+          <a:effectLst>
+            <a:glow rad="101600">
+              <a:schemeClr val="accent3">
+                <a:satMod val="175000"/>
+                <a:alpha val="40000"/>
+              </a:schemeClr>
+            </a:glow>
+          </a:effectLst>
+        </p:grpSpPr>
+        <p:pic>
+          <p:nvPicPr>
+            <p:cNvPr id="5" name="Picture 2" descr="Translate Tools Stock Illustrations, Cliparts And Royalty Free Translate  Tools Vectors">
+              <a:extLst>
+                <a:ext uri="{FF2B5EF4-FFF2-40B4-BE49-F238E27FC236}">
+                  <a16:creationId xmlns:a16="http://schemas.microsoft.com/office/drawing/2014/main" id="{EA103013-A2EB-4A78-843E-14055D3E0666}"/>
+                </a:ext>
+              </a:extLst>
+            </p:cNvPr>
+            <p:cNvPicPr>
+              <a:picLocks noChangeAspect="1" noChangeArrowheads="1"/>
+            </p:cNvPicPr>
+            <p:nvPr/>
+          </p:nvPicPr>
+          <p:blipFill rotWithShape="1">
+            <a:blip r:embed="rId2">
+              <a:clrChange>
+                <a:clrFrom>
+                  <a:srgbClr val="FFFFFF"/>
+                </a:clrFrom>
+                <a:clrTo>
+                  <a:srgbClr val="FFFFFF">
+                    <a:alpha val="0"/>
+                  </a:srgbClr>
+                </a:clrTo>
+              </a:clrChange>
+            </a:blip>
+            <a:srcRect l="47230"/>
+            <a:stretch/>
+          </p:blipFill>
+          <p:spPr bwMode="auto">
+            <a:xfrm>
+              <a:off x="3488780" y="3983356"/>
+              <a:ext cx="759891" cy="1440000"/>
+            </a:xfrm>
+            <a:prstGeom prst="rect">
+              <a:avLst/>
+            </a:prstGeom>
+            <a:noFill/>
+          </p:spPr>
+        </p:pic>
+        <p:pic>
+          <p:nvPicPr>
+            <p:cNvPr id="1030" name="Picture 6" descr="Translate Tools Stock Illustrations, Cliparts And Royalty Free Translate  Tools Vectors">
+              <a:extLst>
+                <a:ext uri="{FF2B5EF4-FFF2-40B4-BE49-F238E27FC236}">
+                  <a16:creationId xmlns:a16="http://schemas.microsoft.com/office/drawing/2014/main" id="{DB3AC73C-8354-44A5-83C9-6EFB8B9630D0}"/>
+                </a:ext>
+              </a:extLst>
+            </p:cNvPr>
+            <p:cNvPicPr>
+              <a:picLocks noChangeAspect="1" noChangeArrowheads="1"/>
+            </p:cNvPicPr>
+            <p:nvPr/>
+          </p:nvPicPr>
+          <p:blipFill>
+            <a:blip r:embed="rId3">
+              <a:extLst>
+                <a:ext uri="{BEBA8EAE-BF5A-486C-A8C5-ECC9F3942E4B}">
+                  <a14:imgProps xmlns:a14="http://schemas.microsoft.com/office/drawing/2010/main">
+                    <a14:imgLayer r:embed="rId4">
+                      <a14:imgEffect>
+                        <a14:backgroundRemoval t="10000" b="90000" l="10000" r="90000"/>
+                      </a14:imgEffect>
+                    </a14:imgLayer>
+                  </a14:imgProps>
+                </a:ext>
+                <a:ext uri="{28A0092B-C50C-407E-A947-70E740481C1C}">
+                  <a14:useLocalDpi xmlns:a14="http://schemas.microsoft.com/office/drawing/2010/main" val="0"/>
+                </a:ext>
+              </a:extLst>
+            </a:blip>
+            <a:srcRect/>
+            <a:stretch>
+              <a:fillRect/>
+            </a:stretch>
+          </p:blipFill>
+          <p:spPr bwMode="auto">
+            <a:xfrm>
+              <a:off x="2808511" y="3983276"/>
+              <a:ext cx="1440160" cy="1440160"/>
+            </a:xfrm>
+            <a:prstGeom prst="rect">
+              <a:avLst/>
+            </a:prstGeom>
+            <a:noFill/>
+            <a:extLst>
+              <a:ext uri="{909E8E84-426E-40DD-AFC4-6F175D3DCCD1}">
+                <a14:hiddenFill xmlns:a14="http://schemas.microsoft.com/office/drawing/2010/main">
+                  <a:solidFill>
+                    <a:srgbClr val="FFFFFF"/>
+                  </a:solidFill>
+                </a14:hiddenFill>
+              </a:ext>
+            </a:extLst>
+          </p:spPr>
+        </p:pic>
+        <p:pic>
+          <p:nvPicPr>
+            <p:cNvPr id="8" name="Picture 2" descr="Translate Tools Stock Illustrations, Cliparts And Royalty Free Translate  Tools Vectors">
+              <a:extLst>
+                <a:ext uri="{FF2B5EF4-FFF2-40B4-BE49-F238E27FC236}">
+                  <a16:creationId xmlns:a16="http://schemas.microsoft.com/office/drawing/2014/main" id="{CE638C29-A02F-400A-BE1E-CB100DA9EB2C}"/>
+                </a:ext>
+              </a:extLst>
+            </p:cNvPr>
+            <p:cNvPicPr>
+              <a:picLocks noChangeAspect="1" noChangeArrowheads="1"/>
+            </p:cNvPicPr>
+            <p:nvPr/>
+          </p:nvPicPr>
+          <p:blipFill rotWithShape="1">
+            <a:blip r:embed="rId2">
+              <a:clrChange>
+                <a:clrFrom>
+                  <a:srgbClr val="FFFFFF"/>
+                </a:clrFrom>
+                <a:clrTo>
+                  <a:srgbClr val="FFFFFF">
+                    <a:alpha val="0"/>
+                  </a:srgbClr>
+                </a:clrTo>
+              </a:clrChange>
+            </a:blip>
+            <a:srcRect t="47820"/>
+            <a:stretch/>
+          </p:blipFill>
+          <p:spPr bwMode="auto">
+            <a:xfrm>
+              <a:off x="2808671" y="4670714"/>
+              <a:ext cx="1440000" cy="751400"/>
+            </a:xfrm>
+            <a:prstGeom prst="rect">
+              <a:avLst/>
+            </a:prstGeom>
+            <a:noFill/>
+          </p:spPr>
+        </p:pic>
+        <p:sp>
+          <p:nvSpPr>
+            <p:cNvPr id="3" name="직사각형 2">
+              <a:extLst>
+                <a:ext uri="{FF2B5EF4-FFF2-40B4-BE49-F238E27FC236}">
+                  <a16:creationId xmlns:a16="http://schemas.microsoft.com/office/drawing/2014/main" id="{F1E50900-B3CA-4D6B-A3ED-B2E764F725A3}"/>
+                </a:ext>
+              </a:extLst>
+            </p:cNvPr>
+            <p:cNvSpPr/>
+            <p:nvPr/>
+          </p:nvSpPr>
+          <p:spPr>
+            <a:xfrm>
+              <a:off x="2997498" y="4248671"/>
+              <a:ext cx="531093" cy="420721"/>
+            </a:xfrm>
+            <a:prstGeom prst="rect">
+              <a:avLst/>
+            </a:prstGeom>
+            <a:noFill/>
+            <a:ln>
+              <a:noFill/>
+            </a:ln>
+          </p:spPr>
+          <p:style>
+            <a:lnRef idx="2">
+              <a:schemeClr val="accent1">
+                <a:shade val="50000"/>
+              </a:schemeClr>
+            </a:lnRef>
+            <a:fillRef idx="1">
+              <a:schemeClr val="accent1"/>
+            </a:fillRef>
+            <a:effectRef idx="0">
+              <a:schemeClr val="accent1"/>
+            </a:effectRef>
+            <a:fontRef idx="minor">
+              <a:schemeClr val="lt1"/>
+            </a:fontRef>
+          </p:style>
+          <p:txBody>
+            <a:bodyPr rtlCol="0" anchor="ctr"/>
+            <a:lstStyle/>
+            <a:p>
+              <a:pPr algn="ctr"/>
+              <a:r>
+                <a:rPr lang="ko-KR" altLang="en-US" sz="8000" dirty="0" err="1">
+                  <a:solidFill>
+                    <a:sysClr val="windowText" lastClr="000000"/>
+                  </a:solidFill>
+                  <a:latin typeface="KoPub돋움체 Medium" panose="02020603020101020101" pitchFamily="18" charset="-127"/>
+                  <a:ea typeface="KoPub돋움체 Medium" panose="02020603020101020101" pitchFamily="18" charset="-127"/>
+                </a:rPr>
+                <a:t>ㄱ</a:t>
+              </a:r>
+              <a:endParaRPr lang="ko-KR" altLang="en-US" sz="8000" dirty="0">
+                <a:solidFill>
+                  <a:sysClr val="windowText" lastClr="000000"/>
+                </a:solidFill>
+                <a:latin typeface="KoPub돋움체 Medium" panose="02020603020101020101" pitchFamily="18" charset="-127"/>
+                <a:ea typeface="KoPub돋움체 Medium" panose="02020603020101020101" pitchFamily="18" charset="-127"/>
+              </a:endParaRPr>
+            </a:p>
+          </p:txBody>
+        </p:sp>
+      </p:grpSp>
+    </p:spTree>
+    <p:extLst>
+      <p:ext uri="{BB962C8B-B14F-4D97-AF65-F5344CB8AC3E}">
+        <p14:creationId xmlns:p14="http://schemas.microsoft.com/office/powerpoint/2010/main" val="2238557897"/>
+      </p:ext>
+    </p:extLst>
+  </p:cSld>
+  <p:clrMapOvr>
+    <a:masterClrMapping/>
+  </p:clrMapOvr>
+</p:sld>
+</file>
+
 <file path=ppt/theme/theme1.xml><?xml version="1.0" encoding="utf-8"?>
 <a:theme xmlns:a="http://schemas.openxmlformats.org/drawingml/2006/main" name="Office 테마">
   <a:themeElements>

</xml_diff>

<commit_message>
add font file & logo image
</commit_message>
<xml_diff>
--- a/design.pptx
+++ b/design.pptx
@@ -11,6 +11,7 @@
     <p:sldId id="261" r:id="rId5"/>
     <p:sldId id="262" r:id="rId6"/>
     <p:sldId id="263" r:id="rId7"/>
+    <p:sldId id="264" r:id="rId8"/>
   </p:sldIdLst>
   <p:sldSz cx="5761038" cy="5761038"/>
   <p:notesSz cx="6858000" cy="9144000"/>
@@ -308,7 +309,7 @@
             <a:fld id="{B431DB3D-C2BB-4DBE-9C63-7A3084D9948D}" type="datetimeFigureOut">
               <a:rPr lang="ko-KR" altLang="en-US" smtClean="0"/>
               <a:pPr/>
-              <a:t>2021-03-21</a:t>
+              <a:t>2021-03-22</a:t>
             </a:fld>
             <a:endParaRPr lang="ko-KR" altLang="en-US"/>
           </a:p>
@@ -473,7 +474,7 @@
             <a:fld id="{B431DB3D-C2BB-4DBE-9C63-7A3084D9948D}" type="datetimeFigureOut">
               <a:rPr lang="ko-KR" altLang="en-US" smtClean="0"/>
               <a:pPr/>
-              <a:t>2021-03-21</a:t>
+              <a:t>2021-03-22</a:t>
             </a:fld>
             <a:endParaRPr lang="ko-KR" altLang="en-US"/>
           </a:p>
@@ -648,7 +649,7 @@
             <a:fld id="{B431DB3D-C2BB-4DBE-9C63-7A3084D9948D}" type="datetimeFigureOut">
               <a:rPr lang="ko-KR" altLang="en-US" smtClean="0"/>
               <a:pPr/>
-              <a:t>2021-03-21</a:t>
+              <a:t>2021-03-22</a:t>
             </a:fld>
             <a:endParaRPr lang="ko-KR" altLang="en-US"/>
           </a:p>
@@ -813,7 +814,7 @@
             <a:fld id="{B431DB3D-C2BB-4DBE-9C63-7A3084D9948D}" type="datetimeFigureOut">
               <a:rPr lang="ko-KR" altLang="en-US" smtClean="0"/>
               <a:pPr/>
-              <a:t>2021-03-21</a:t>
+              <a:t>2021-03-22</a:t>
             </a:fld>
             <a:endParaRPr lang="ko-KR" altLang="en-US"/>
           </a:p>
@@ -1055,7 +1056,7 @@
             <a:fld id="{B431DB3D-C2BB-4DBE-9C63-7A3084D9948D}" type="datetimeFigureOut">
               <a:rPr lang="ko-KR" altLang="en-US" smtClean="0"/>
               <a:pPr/>
-              <a:t>2021-03-21</a:t>
+              <a:t>2021-03-22</a:t>
             </a:fld>
             <a:endParaRPr lang="ko-KR" altLang="en-US"/>
           </a:p>
@@ -1337,7 +1338,7 @@
             <a:fld id="{B431DB3D-C2BB-4DBE-9C63-7A3084D9948D}" type="datetimeFigureOut">
               <a:rPr lang="ko-KR" altLang="en-US" smtClean="0"/>
               <a:pPr/>
-              <a:t>2021-03-21</a:t>
+              <a:t>2021-03-22</a:t>
             </a:fld>
             <a:endParaRPr lang="ko-KR" altLang="en-US"/>
           </a:p>
@@ -1758,7 +1759,7 @@
             <a:fld id="{B431DB3D-C2BB-4DBE-9C63-7A3084D9948D}" type="datetimeFigureOut">
               <a:rPr lang="ko-KR" altLang="en-US" smtClean="0"/>
               <a:pPr/>
-              <a:t>2021-03-21</a:t>
+              <a:t>2021-03-22</a:t>
             </a:fld>
             <a:endParaRPr lang="ko-KR" altLang="en-US"/>
           </a:p>
@@ -1872,7 +1873,7 @@
             <a:fld id="{B431DB3D-C2BB-4DBE-9C63-7A3084D9948D}" type="datetimeFigureOut">
               <a:rPr lang="ko-KR" altLang="en-US" smtClean="0"/>
               <a:pPr/>
-              <a:t>2021-03-21</a:t>
+              <a:t>2021-03-22</a:t>
             </a:fld>
             <a:endParaRPr lang="ko-KR" altLang="en-US"/>
           </a:p>
@@ -1964,7 +1965,7 @@
             <a:fld id="{B431DB3D-C2BB-4DBE-9C63-7A3084D9948D}" type="datetimeFigureOut">
               <a:rPr lang="ko-KR" altLang="en-US" smtClean="0"/>
               <a:pPr/>
-              <a:t>2021-03-21</a:t>
+              <a:t>2021-03-22</a:t>
             </a:fld>
             <a:endParaRPr lang="ko-KR" altLang="en-US"/>
           </a:p>
@@ -2236,7 +2237,7 @@
             <a:fld id="{B431DB3D-C2BB-4DBE-9C63-7A3084D9948D}" type="datetimeFigureOut">
               <a:rPr lang="ko-KR" altLang="en-US" smtClean="0"/>
               <a:pPr/>
-              <a:t>2021-03-21</a:t>
+              <a:t>2021-03-22</a:t>
             </a:fld>
             <a:endParaRPr lang="ko-KR" altLang="en-US"/>
           </a:p>
@@ -2485,7 +2486,7 @@
             <a:fld id="{B431DB3D-C2BB-4DBE-9C63-7A3084D9948D}" type="datetimeFigureOut">
               <a:rPr lang="ko-KR" altLang="en-US" smtClean="0"/>
               <a:pPr/>
-              <a:t>2021-03-21</a:t>
+              <a:t>2021-03-22</a:t>
             </a:fld>
             <a:endParaRPr lang="ko-KR" altLang="en-US"/>
           </a:p>
@@ -2693,7 +2694,7 @@
             <a:fld id="{B431DB3D-C2BB-4DBE-9C63-7A3084D9948D}" type="datetimeFigureOut">
               <a:rPr lang="ko-KR" altLang="en-US" smtClean="0"/>
               <a:pPr/>
-              <a:t>2021-03-21</a:t>
+              <a:t>2021-03-22</a:t>
             </a:fld>
             <a:endParaRPr lang="ko-KR" altLang="en-US"/>
           </a:p>
@@ -16929,6 +16930,332 @@
 </p:sld>
 </file>
 
+<file path=ppt/slides/slide7.xml><?xml version="1.0" encoding="utf-8"?>
+<p:sld xmlns:a="http://schemas.openxmlformats.org/drawingml/2006/main" xmlns:r="http://schemas.openxmlformats.org/officeDocument/2006/relationships" xmlns:p="http://schemas.openxmlformats.org/presentationml/2006/main">
+  <p:cSld>
+    <p:spTree>
+      <p:nvGrpSpPr>
+        <p:cNvPr id="1" name=""/>
+        <p:cNvGrpSpPr/>
+        <p:nvPr/>
+      </p:nvGrpSpPr>
+      <p:grpSpPr>
+        <a:xfrm>
+          <a:off x="0" y="0"/>
+          <a:ext cx="0" cy="0"/>
+          <a:chOff x="0" y="0"/>
+          <a:chExt cx="0" cy="0"/>
+        </a:xfrm>
+      </p:grpSpPr>
+      <p:sp>
+        <p:nvSpPr>
+          <p:cNvPr id="2" name="사각형: 둥근 모서리 1">
+            <a:extLst>
+              <a:ext uri="{FF2B5EF4-FFF2-40B4-BE49-F238E27FC236}">
+                <a16:creationId xmlns:a16="http://schemas.microsoft.com/office/drawing/2014/main" id="{720BD0EF-147A-4606-925F-F1CB1545E644}"/>
+              </a:ext>
+            </a:extLst>
+          </p:cNvPr>
+          <p:cNvSpPr/>
+          <p:nvPr/>
+        </p:nvSpPr>
+        <p:spPr>
+          <a:xfrm>
+            <a:off x="1184143" y="814240"/>
+            <a:ext cx="2952328" cy="2952328"/>
+          </a:xfrm>
+          <a:prstGeom prst="roundRect">
+            <a:avLst/>
+          </a:prstGeom>
+          <a:solidFill>
+            <a:schemeClr val="accent5">
+              <a:lumMod val="60000"/>
+              <a:lumOff val="40000"/>
+              <a:alpha val="75000"/>
+            </a:schemeClr>
+          </a:solidFill>
+          <a:ln>
+            <a:noFill/>
+          </a:ln>
+          <a:scene3d>
+            <a:camera prst="orthographicFront"/>
+            <a:lightRig rig="threePt" dir="t"/>
+          </a:scene3d>
+          <a:sp3d>
+            <a:bevelT/>
+          </a:sp3d>
+        </p:spPr>
+        <p:style>
+          <a:lnRef idx="2">
+            <a:schemeClr val="accent1">
+              <a:shade val="50000"/>
+            </a:schemeClr>
+          </a:lnRef>
+          <a:fillRef idx="1">
+            <a:schemeClr val="accent1"/>
+          </a:fillRef>
+          <a:effectRef idx="0">
+            <a:schemeClr val="accent1"/>
+          </a:effectRef>
+          <a:fontRef idx="minor">
+            <a:schemeClr val="lt1"/>
+          </a:fontRef>
+        </p:style>
+        <p:txBody>
+          <a:bodyPr rtlCol="0" anchor="ctr"/>
+          <a:lstStyle/>
+          <a:p>
+            <a:pPr algn="ctr"/>
+            <a:endParaRPr lang="ko-KR" altLang="en-US" dirty="0"/>
+          </a:p>
+        </p:txBody>
+      </p:sp>
+      <p:grpSp>
+        <p:nvGrpSpPr>
+          <p:cNvPr id="4" name="그룹 3">
+            <a:extLst>
+              <a:ext uri="{FF2B5EF4-FFF2-40B4-BE49-F238E27FC236}">
+                <a16:creationId xmlns:a16="http://schemas.microsoft.com/office/drawing/2014/main" id="{0CE4E01C-1907-436A-8C27-E6B4383F7773}"/>
+              </a:ext>
+            </a:extLst>
+          </p:cNvPr>
+          <p:cNvGrpSpPr/>
+          <p:nvPr/>
+        </p:nvGrpSpPr>
+        <p:grpSpPr>
+          <a:xfrm>
+            <a:off x="1375487" y="1030264"/>
+            <a:ext cx="2569641" cy="2520280"/>
+            <a:chOff x="2808511" y="3983276"/>
+            <a:chExt cx="1440160" cy="1440160"/>
+          </a:xfrm>
+          <a:effectLst>
+            <a:glow rad="101600">
+              <a:schemeClr val="accent3">
+                <a:satMod val="175000"/>
+                <a:alpha val="40000"/>
+              </a:schemeClr>
+            </a:glow>
+          </a:effectLst>
+        </p:grpSpPr>
+        <p:pic>
+          <p:nvPicPr>
+            <p:cNvPr id="5" name="Picture 2" descr="Translate Tools Stock Illustrations, Cliparts And Royalty Free Translate  Tools Vectors">
+              <a:extLst>
+                <a:ext uri="{FF2B5EF4-FFF2-40B4-BE49-F238E27FC236}">
+                  <a16:creationId xmlns:a16="http://schemas.microsoft.com/office/drawing/2014/main" id="{EA103013-A2EB-4A78-843E-14055D3E0666}"/>
+                </a:ext>
+              </a:extLst>
+            </p:cNvPr>
+            <p:cNvPicPr>
+              <a:picLocks noChangeAspect="1" noChangeArrowheads="1"/>
+            </p:cNvPicPr>
+            <p:nvPr/>
+          </p:nvPicPr>
+          <p:blipFill rotWithShape="1">
+            <a:blip r:embed="rId2">
+              <a:clrChange>
+                <a:clrFrom>
+                  <a:srgbClr val="FFFFFF"/>
+                </a:clrFrom>
+                <a:clrTo>
+                  <a:srgbClr val="FFFFFF">
+                    <a:alpha val="0"/>
+                  </a:srgbClr>
+                </a:clrTo>
+              </a:clrChange>
+            </a:blip>
+            <a:srcRect l="47230"/>
+            <a:stretch/>
+          </p:blipFill>
+          <p:spPr bwMode="auto">
+            <a:xfrm>
+              <a:off x="3488780" y="3983356"/>
+              <a:ext cx="759891" cy="1440000"/>
+            </a:xfrm>
+            <a:prstGeom prst="rect">
+              <a:avLst/>
+            </a:prstGeom>
+            <a:noFill/>
+          </p:spPr>
+        </p:pic>
+        <p:pic>
+          <p:nvPicPr>
+            <p:cNvPr id="1030" name="Picture 6" descr="Translate Tools Stock Illustrations, Cliparts And Royalty Free Translate  Tools Vectors">
+              <a:extLst>
+                <a:ext uri="{FF2B5EF4-FFF2-40B4-BE49-F238E27FC236}">
+                  <a16:creationId xmlns:a16="http://schemas.microsoft.com/office/drawing/2014/main" id="{DB3AC73C-8354-44A5-83C9-6EFB8B9630D0}"/>
+                </a:ext>
+              </a:extLst>
+            </p:cNvPr>
+            <p:cNvPicPr>
+              <a:picLocks noChangeAspect="1" noChangeArrowheads="1"/>
+            </p:cNvPicPr>
+            <p:nvPr/>
+          </p:nvPicPr>
+          <p:blipFill>
+            <a:blip r:embed="rId3">
+              <a:extLst>
+                <a:ext uri="{BEBA8EAE-BF5A-486C-A8C5-ECC9F3942E4B}">
+                  <a14:imgProps xmlns:a14="http://schemas.microsoft.com/office/drawing/2010/main">
+                    <a14:imgLayer r:embed="rId4">
+                      <a14:imgEffect>
+                        <a14:backgroundRemoval t="10000" b="90000" l="10000" r="90000"/>
+                      </a14:imgEffect>
+                    </a14:imgLayer>
+                  </a14:imgProps>
+                </a:ext>
+                <a:ext uri="{28A0092B-C50C-407E-A947-70E740481C1C}">
+                  <a14:useLocalDpi xmlns:a14="http://schemas.microsoft.com/office/drawing/2010/main" val="0"/>
+                </a:ext>
+              </a:extLst>
+            </a:blip>
+            <a:srcRect/>
+            <a:stretch>
+              <a:fillRect/>
+            </a:stretch>
+          </p:blipFill>
+          <p:spPr bwMode="auto">
+            <a:xfrm>
+              <a:off x="2808511" y="3983276"/>
+              <a:ext cx="1440160" cy="1440160"/>
+            </a:xfrm>
+            <a:prstGeom prst="rect">
+              <a:avLst/>
+            </a:prstGeom>
+            <a:noFill/>
+            <a:extLst>
+              <a:ext uri="{909E8E84-426E-40DD-AFC4-6F175D3DCCD1}">
+                <a14:hiddenFill xmlns:a14="http://schemas.microsoft.com/office/drawing/2010/main">
+                  <a:solidFill>
+                    <a:srgbClr val="FFFFFF"/>
+                  </a:solidFill>
+                </a14:hiddenFill>
+              </a:ext>
+            </a:extLst>
+          </p:spPr>
+        </p:pic>
+        <p:pic>
+          <p:nvPicPr>
+            <p:cNvPr id="8" name="Picture 2" descr="Translate Tools Stock Illustrations, Cliparts And Royalty Free Translate  Tools Vectors">
+              <a:extLst>
+                <a:ext uri="{FF2B5EF4-FFF2-40B4-BE49-F238E27FC236}">
+                  <a16:creationId xmlns:a16="http://schemas.microsoft.com/office/drawing/2014/main" id="{CE638C29-A02F-400A-BE1E-CB100DA9EB2C}"/>
+                </a:ext>
+              </a:extLst>
+            </p:cNvPr>
+            <p:cNvPicPr>
+              <a:picLocks noChangeAspect="1" noChangeArrowheads="1"/>
+            </p:cNvPicPr>
+            <p:nvPr/>
+          </p:nvPicPr>
+          <p:blipFill rotWithShape="1">
+            <a:blip r:embed="rId2">
+              <a:clrChange>
+                <a:clrFrom>
+                  <a:srgbClr val="FFFFFF"/>
+                </a:clrFrom>
+                <a:clrTo>
+                  <a:srgbClr val="FFFFFF">
+                    <a:alpha val="0"/>
+                  </a:srgbClr>
+                </a:clrTo>
+              </a:clrChange>
+            </a:blip>
+            <a:srcRect t="47820"/>
+            <a:stretch/>
+          </p:blipFill>
+          <p:spPr bwMode="auto">
+            <a:xfrm>
+              <a:off x="2808671" y="4670714"/>
+              <a:ext cx="1440000" cy="751400"/>
+            </a:xfrm>
+            <a:prstGeom prst="rect">
+              <a:avLst/>
+            </a:prstGeom>
+            <a:noFill/>
+          </p:spPr>
+        </p:pic>
+        <p:sp>
+          <p:nvSpPr>
+            <p:cNvPr id="3" name="직사각형 2">
+              <a:extLst>
+                <a:ext uri="{FF2B5EF4-FFF2-40B4-BE49-F238E27FC236}">
+                  <a16:creationId xmlns:a16="http://schemas.microsoft.com/office/drawing/2014/main" id="{F1E50900-B3CA-4D6B-A3ED-B2E764F725A3}"/>
+                </a:ext>
+              </a:extLst>
+            </p:cNvPr>
+            <p:cNvSpPr/>
+            <p:nvPr/>
+          </p:nvSpPr>
+          <p:spPr>
+            <a:xfrm>
+              <a:off x="2997498" y="4248671"/>
+              <a:ext cx="531093" cy="420721"/>
+            </a:xfrm>
+            <a:prstGeom prst="rect">
+              <a:avLst/>
+            </a:prstGeom>
+            <a:noFill/>
+            <a:ln>
+              <a:noFill/>
+            </a:ln>
+          </p:spPr>
+          <p:style>
+            <a:lnRef idx="2">
+              <a:schemeClr val="accent1">
+                <a:shade val="50000"/>
+              </a:schemeClr>
+            </a:lnRef>
+            <a:fillRef idx="1">
+              <a:schemeClr val="accent1"/>
+            </a:fillRef>
+            <a:effectRef idx="0">
+              <a:schemeClr val="accent1"/>
+            </a:effectRef>
+            <a:fontRef idx="minor">
+              <a:schemeClr val="lt1"/>
+            </a:fontRef>
+          </p:style>
+          <p:txBody>
+            <a:bodyPr rtlCol="0" anchor="ctr"/>
+            <a:lstStyle/>
+            <a:p>
+              <a:pPr algn="ctr"/>
+              <a:r>
+                <a:rPr lang="ko-KR" altLang="en-US" sz="8000" dirty="0" err="1">
+                  <a:solidFill>
+                    <a:sysClr val="windowText" lastClr="000000"/>
+                  </a:solidFill>
+                  <a:latin typeface="KoPub돋움체 Medium" panose="02020603020101020101" pitchFamily="18" charset="-127"/>
+                  <a:ea typeface="KoPub돋움체 Medium" panose="02020603020101020101" pitchFamily="18" charset="-127"/>
+                </a:rPr>
+                <a:t>ㄱ</a:t>
+              </a:r>
+              <a:endParaRPr lang="ko-KR" altLang="en-US" sz="8000" dirty="0">
+                <a:solidFill>
+                  <a:sysClr val="windowText" lastClr="000000"/>
+                </a:solidFill>
+                <a:latin typeface="KoPub돋움체 Medium" panose="02020603020101020101" pitchFamily="18" charset="-127"/>
+                <a:ea typeface="KoPub돋움체 Medium" panose="02020603020101020101" pitchFamily="18" charset="-127"/>
+              </a:endParaRPr>
+            </a:p>
+          </p:txBody>
+        </p:sp>
+      </p:grpSp>
+    </p:spTree>
+    <p:extLst>
+      <p:ext uri="{BB962C8B-B14F-4D97-AF65-F5344CB8AC3E}">
+        <p14:creationId xmlns:p14="http://schemas.microsoft.com/office/powerpoint/2010/main" val="2238557897"/>
+      </p:ext>
+    </p:extLst>
+  </p:cSld>
+  <p:clrMapOvr>
+    <a:masterClrMapping/>
+  </p:clrMapOvr>
+</p:sld>
+</file>
+
 <file path=ppt/theme/theme1.xml><?xml version="1.0" encoding="utf-8"?>
 <a:theme xmlns:a="http://schemas.openxmlformats.org/drawingml/2006/main" name="Office 테마">
   <a:themeElements>

</xml_diff>